<commit_message>
fix: project management presentation
</commit_message>
<xml_diff>
--- a/Présentation - Kanban + Outil de gestion de projet.pptx
+++ b/Présentation - Kanban + Outil de gestion de projet.pptx
@@ -3568,7 +3568,7 @@
           <a:p>
             <a:r>
               <a:rPr lang="fr-FR" dirty="0"/>
-              <a:t>Notion est une application de prise de note collaborative avec énormément de fonctionnalité</a:t>
+              <a:t>Notion est une application de prise de notes collaboratives avec énormément de fonctionnalités</a:t>
             </a:r>
           </a:p>
           <a:p>
@@ -3750,7 +3750,7 @@
             <a:pPr algn="ctr"/>
             <a:r>
               <a:rPr lang="fr-FR" dirty="0"/>
-              <a:t>Les différentes story peuvent être déplacé entre les différentes colonne pour changer leur statut</a:t>
+              <a:t>Les différentes stories peuvent être déplacés entre les différentes colonnes pour changer leur statut</a:t>
             </a:r>
           </a:p>
           <a:p>
@@ -3797,7 +3797,7 @@
             <a:pPr algn="ctr"/>
             <a:r>
               <a:rPr lang="fr-FR" dirty="0"/>
-              <a:t>Cela permet de voir facilement ou en sont les différentes tâches et si quelqu’un est bloqué dessus</a:t>
+              <a:t>Cela permet de voir facilement où en sont les différentes tâches et si quelqu’un est bloqué dessus</a:t>
             </a:r>
           </a:p>
         </p:txBody>
@@ -4361,7 +4361,7 @@
         <p:spPr>
           <a:xfrm>
             <a:off x="7375523" y="2126812"/>
-            <a:ext cx="4368802" cy="2585323"/>
+            <a:ext cx="4368802" cy="2862322"/>
           </a:xfrm>
           <a:prstGeom prst="rect">
             <a:avLst/>
@@ -4376,7 +4376,7 @@
           <a:p>
             <a:r>
               <a:rPr lang="fr-FR" dirty="0"/>
-              <a:t>Chaque User Stories est une page à part entière qui détaille :</a:t>
+              <a:t>Chaque User Story est une page à part entière qui détaille :</a:t>
             </a:r>
           </a:p>
           <a:p>
@@ -4400,7 +4400,7 @@
           <a:p>
             <a:r>
               <a:rPr lang="fr-FR" dirty="0"/>
-              <a:t>Ainsi que dans certain cas :</a:t>
+              <a:t>Ainsi que dans certains cas :</a:t>
             </a:r>
           </a:p>
           <a:p>
@@ -4413,6 +4413,12 @@
             <a:r>
               <a:rPr lang="fr-FR" dirty="0"/>
               <a:t>- Les futurs améliorations/changements</a:t>
+            </a:r>
+          </a:p>
+          <a:p>
+            <a:r>
+              <a:rPr lang="fr-FR" dirty="0"/>
+              <a:t>- Les détails techniques</a:t>
             </a:r>
           </a:p>
         </p:txBody>
@@ -4654,7 +4660,7 @@
           <a:p>
             <a:r>
               <a:rPr lang="fr-FR" dirty="0"/>
-              <a:t>Terminé par un Sprint </a:t>
+              <a:t>Terminés par un Sprint </a:t>
             </a:r>
             <a:r>
               <a:rPr lang="fr-FR" dirty="0" err="1"/>
@@ -4671,7 +4677,7 @@
           <a:p>
             <a:r>
               <a:rPr lang="fr-FR" dirty="0"/>
-              <a:t>Il y’aura également des petites réunions journalières pour communiquez les avancées des différents membres de l’équipe </a:t>
+              <a:t>Il y aura également des petites réunions journalières pour communiquer les avancées des différents membres de l’équipe </a:t>
             </a:r>
           </a:p>
         </p:txBody>

</xml_diff>